<commit_message>
restaurar archivos del 2.HOLA  borrados por error al cargar el HOL.B
</commit_message>
<xml_diff>
--- a/3. Herramientas de desarrollo en Microsoft Edge/HOL.A/lab.pptx
+++ b/3. Herramientas de desarrollo en Microsoft Edge/HOL.A/lab.pptx
@@ -8,12 +8,13 @@
     <p:sldMasterId id="2147483780" r:id="rId4"/>
   </p:sldMasterIdLst>
   <p:notesMasterIdLst>
-    <p:notesMasterId r:id="rId8"/>
+    <p:notesMasterId r:id="rId9"/>
   </p:notesMasterIdLst>
   <p:sldIdLst>
     <p:sldId id="256" r:id="rId5"/>
     <p:sldId id="310" r:id="rId6"/>
-    <p:sldId id="296" r:id="rId7"/>
+    <p:sldId id="311" r:id="rId7"/>
+    <p:sldId id="296" r:id="rId8"/>
   </p:sldIdLst>
   <p:sldSz cx="12192000" cy="6858000"/>
   <p:notesSz cx="6858000" cy="9144000"/>
@@ -608,7 +609,7 @@
           <a:p>
             <a:fld id="{DDCD61BB-790A-4EFE-904A-F3FC061E4182}" type="datetime8">
               <a:rPr lang="en-US" smtClean="0"/>
-              <a:t>10/27/2015 12:07 AM</a:t>
+              <a:t>10/27/2015 4:14 PM</a:t>
             </a:fld>
             <a:endParaRPr lang="en-US" dirty="0"/>
           </a:p>
@@ -642,6 +643,187 @@
     <p:extLst>
       <p:ext uri="{BB962C8B-B14F-4D97-AF65-F5344CB8AC3E}">
         <p14:creationId xmlns:p14="http://schemas.microsoft.com/office/powerpoint/2010/main" val="4010523085"/>
+      </p:ext>
+    </p:extLst>
+  </p:cSld>
+  <p:clrMapOvr>
+    <a:masterClrMapping/>
+  </p:clrMapOvr>
+</p:notes>
+</file>
+
+<file path=ppt/notesSlides/notesSlide2.xml><?xml version="1.0" encoding="utf-8"?>
+<p:notes xmlns:a="http://schemas.openxmlformats.org/drawingml/2006/main" xmlns:r="http://schemas.openxmlformats.org/officeDocument/2006/relationships" xmlns:p="http://schemas.openxmlformats.org/presentationml/2006/main">
+  <p:cSld>
+    <p:spTree>
+      <p:nvGrpSpPr>
+        <p:cNvPr id="1" name=""/>
+        <p:cNvGrpSpPr/>
+        <p:nvPr/>
+      </p:nvGrpSpPr>
+      <p:grpSpPr>
+        <a:xfrm>
+          <a:off x="0" y="0"/>
+          <a:ext cx="0" cy="0"/>
+          <a:chOff x="0" y="0"/>
+          <a:chExt cx="0" cy="0"/>
+        </a:xfrm>
+      </p:grpSpPr>
+      <p:sp>
+        <p:nvSpPr>
+          <p:cNvPr id="2" name="Slide Image Placeholder 1"/>
+          <p:cNvSpPr>
+            <a:spLocks noGrp="1" noRot="1" noChangeAspect="1"/>
+          </p:cNvSpPr>
+          <p:nvPr>
+            <p:ph type="sldImg"/>
+          </p:nvPr>
+        </p:nvSpPr>
+        <p:spPr/>
+      </p:sp>
+      <p:sp>
+        <p:nvSpPr>
+          <p:cNvPr id="3" name="Notes Placeholder 2"/>
+          <p:cNvSpPr>
+            <a:spLocks noGrp="1"/>
+          </p:cNvSpPr>
+          <p:nvPr>
+            <p:ph type="body" idx="1"/>
+          </p:nvPr>
+        </p:nvSpPr>
+        <p:spPr/>
+        <p:txBody>
+          <a:bodyPr/>
+          <a:lstStyle/>
+          <a:p>
+            <a:endParaRPr lang="en-US" dirty="0"/>
+          </a:p>
+        </p:txBody>
+      </p:sp>
+      <p:sp>
+        <p:nvSpPr>
+          <p:cNvPr id="4" name="Header Placeholder 3"/>
+          <p:cNvSpPr>
+            <a:spLocks noGrp="1"/>
+          </p:cNvSpPr>
+          <p:nvPr>
+            <p:ph type="hdr" sz="quarter" idx="10"/>
+          </p:nvPr>
+        </p:nvSpPr>
+        <p:spPr/>
+        <p:txBody>
+          <a:bodyPr/>
+          <a:lstStyle/>
+          <a:p>
+            <a:endParaRPr lang="en-US" dirty="0"/>
+          </a:p>
+        </p:txBody>
+      </p:sp>
+      <p:sp>
+        <p:nvSpPr>
+          <p:cNvPr id="5" name="Footer Placeholder 4"/>
+          <p:cNvSpPr>
+            <a:spLocks noGrp="1"/>
+          </p:cNvSpPr>
+          <p:nvPr>
+            <p:ph type="ftr" sz="quarter" idx="11"/>
+          </p:nvPr>
+        </p:nvSpPr>
+        <p:spPr/>
+        <p:txBody>
+          <a:bodyPr/>
+          <a:lstStyle/>
+          <a:p>
+            <a:pPr defTabSz="931436" eaLnBrk="0" hangingPunct="0"/>
+            <a:r>
+              <a:rPr lang="en-US" sz="400" smtClean="0">
+                <a:gradFill>
+                  <a:gsLst>
+                    <a:gs pos="0">
+                      <a:prstClr val="black"/>
+                    </a:gs>
+                    <a:gs pos="100000">
+                      <a:prstClr val="black"/>
+                    </a:gs>
+                  </a:gsLst>
+                  <a:lin ang="5400000" scaled="0"/>
+                </a:gradFill>
+                <a:latin typeface="Segoe UI" pitchFamily="34" charset="0"/>
+                <a:ea typeface="Segoe UI" pitchFamily="34" charset="0"/>
+                <a:cs typeface="Segoe UI" pitchFamily="34" charset="0"/>
+              </a:rPr>
+              <a:t>© 2013 Microsoft Corporation. All rights reserved. Microsoft, Windows, and other product names are or may be registered trademarks and/or trademarks in the U.S. and/or other countries. The information herein is for informational purposes only and represents the current view of Microsoft Corporation as of the date of this presentation.  Because Microsoft must respond to changing market conditions, it should not be interpreted to be a commitment on the part of Microsoft, and Microsoft cannot guarantee the accuracy of any information provided after the date of this presentation.  MICROSOFT MAKES NO WARRANTIES, EXPRESS, IMPLIED OR STATUTORY, AS TO THE INFORMATION IN THIS PRESENTATION.</a:t>
+            </a:r>
+            <a:endParaRPr lang="en-US" sz="400" dirty="0" smtClean="0">
+              <a:gradFill>
+                <a:gsLst>
+                  <a:gs pos="0">
+                    <a:prstClr val="black"/>
+                  </a:gs>
+                  <a:gs pos="100000">
+                    <a:prstClr val="black"/>
+                  </a:gs>
+                </a:gsLst>
+                <a:lin ang="5400000" scaled="0"/>
+              </a:gradFill>
+              <a:latin typeface="Segoe UI" pitchFamily="34" charset="0"/>
+              <a:ea typeface="Segoe UI" pitchFamily="34" charset="0"/>
+              <a:cs typeface="Segoe UI" pitchFamily="34" charset="0"/>
+            </a:endParaRPr>
+          </a:p>
+        </p:txBody>
+      </p:sp>
+      <p:sp>
+        <p:nvSpPr>
+          <p:cNvPr id="6" name="Date Placeholder 5"/>
+          <p:cNvSpPr>
+            <a:spLocks noGrp="1"/>
+          </p:cNvSpPr>
+          <p:nvPr>
+            <p:ph type="dt" idx="12"/>
+          </p:nvPr>
+        </p:nvSpPr>
+        <p:spPr/>
+        <p:txBody>
+          <a:bodyPr/>
+          <a:lstStyle/>
+          <a:p>
+            <a:fld id="{DDCD61BB-790A-4EFE-904A-F3FC061E4182}" type="datetime8">
+              <a:rPr lang="en-US" smtClean="0"/>
+              <a:t>10/27/2015 4:15 PM</a:t>
+            </a:fld>
+            <a:endParaRPr lang="en-US" dirty="0"/>
+          </a:p>
+        </p:txBody>
+      </p:sp>
+      <p:sp>
+        <p:nvSpPr>
+          <p:cNvPr id="7" name="Slide Number Placeholder 6"/>
+          <p:cNvSpPr>
+            <a:spLocks noGrp="1"/>
+          </p:cNvSpPr>
+          <p:nvPr>
+            <p:ph type="sldNum" sz="quarter" idx="13"/>
+          </p:nvPr>
+        </p:nvSpPr>
+        <p:spPr/>
+        <p:txBody>
+          <a:bodyPr/>
+          <a:lstStyle/>
+          <a:p>
+            <a:fld id="{B4008EB6-D09E-4580-8CD6-DDB14511944F}" type="slidenum">
+              <a:rPr lang="en-US" smtClean="0"/>
+              <a:pPr/>
+              <a:t>3</a:t>
+            </a:fld>
+            <a:endParaRPr lang="en-US" dirty="0"/>
+          </a:p>
+        </p:txBody>
+      </p:sp>
+    </p:spTree>
+    <p:extLst>
+      <p:ext uri="{BB962C8B-B14F-4D97-AF65-F5344CB8AC3E}">
+        <p14:creationId xmlns:p14="http://schemas.microsoft.com/office/powerpoint/2010/main" val="3606346444"/>
       </p:ext>
     </p:extLst>
   </p:cSld>
@@ -48328,6 +48510,190 @@
           <a:chExt cx="0" cy="0"/>
         </a:xfrm>
       </p:grpSpPr>
+      <p:pic>
+        <p:nvPicPr>
+          <p:cNvPr id="15" name="Picture 14"/>
+          <p:cNvPicPr>
+            <a:picLocks noChangeAspect="1"/>
+          </p:cNvPicPr>
+          <p:nvPr/>
+        </p:nvPicPr>
+        <p:blipFill rotWithShape="1">
+          <a:blip r:embed="rId3">
+            <a:extLst>
+              <a:ext uri="{28A0092B-C50C-407E-A947-70E740481C1C}">
+                <a14:useLocalDpi xmlns:a14="http://schemas.microsoft.com/office/drawing/2010/main" val="0"/>
+              </a:ext>
+            </a:extLst>
+          </a:blip>
+          <a:srcRect l="5789" t="14619" r="351"/>
+          <a:stretch/>
+        </p:blipFill>
+        <p:spPr>
+          <a:xfrm>
+            <a:off x="5903" y="940359"/>
+            <a:ext cx="6286614" cy="5937745"/>
+          </a:xfrm>
+          <a:prstGeom prst="rect">
+            <a:avLst/>
+          </a:prstGeom>
+        </p:spPr>
+      </p:pic>
+      <p:sp>
+        <p:nvSpPr>
+          <p:cNvPr id="3" name="Title 2"/>
+          <p:cNvSpPr>
+            <a:spLocks noGrp="1"/>
+          </p:cNvSpPr>
+          <p:nvPr>
+            <p:ph type="title"/>
+          </p:nvPr>
+        </p:nvSpPr>
+        <p:spPr>
+          <a:xfrm>
+            <a:off x="1590" y="895"/>
+            <a:ext cx="12190410" cy="939464"/>
+          </a:xfrm>
+          <a:solidFill>
+            <a:schemeClr val="bg2">
+              <a:lumMod val="25000"/>
+              <a:alpha val="70000"/>
+            </a:schemeClr>
+          </a:solidFill>
+        </p:spPr>
+        <p:txBody>
+          <a:bodyPr>
+            <a:normAutofit/>
+          </a:bodyPr>
+          <a:lstStyle/>
+          <a:p>
+            <a:r>
+              <a:rPr lang="es-CO" dirty="0">
+                <a:solidFill>
+                  <a:schemeClr val="bg1"/>
+                </a:solidFill>
+              </a:rPr>
+              <a:t>Ninja Tips - </a:t>
+            </a:r>
+            <a:r>
+              <a:rPr lang="es-CO" sz="3600" dirty="0">
+                <a:solidFill>
+                  <a:schemeClr val="bg1"/>
+                </a:solidFill>
+              </a:rPr>
+              <a:t>http://jkr.im/Ninja-Tips</a:t>
+            </a:r>
+          </a:p>
+        </p:txBody>
+      </p:sp>
+      <p:pic>
+        <p:nvPicPr>
+          <p:cNvPr id="5" name="Imagen 4"/>
+          <p:cNvPicPr>
+            <a:picLocks noChangeAspect="1"/>
+          </p:cNvPicPr>
+          <p:nvPr/>
+        </p:nvPicPr>
+        <p:blipFill>
+          <a:blip r:embed="rId4" cstate="screen">
+            <a:extLst>
+              <a:ext uri="{28A0092B-C50C-407E-A947-70E740481C1C}">
+                <a14:useLocalDpi xmlns:a14="http://schemas.microsoft.com/office/drawing/2010/main"/>
+              </a:ext>
+            </a:extLst>
+          </a:blip>
+          <a:stretch>
+            <a:fillRect/>
+          </a:stretch>
+        </p:blipFill>
+        <p:spPr>
+          <a:xfrm>
+            <a:off x="77769" y="6323847"/>
+            <a:ext cx="2160427" cy="462144"/>
+          </a:xfrm>
+          <a:prstGeom prst="rect">
+            <a:avLst/>
+          </a:prstGeom>
+        </p:spPr>
+      </p:pic>
+      <p:pic>
+        <p:nvPicPr>
+          <p:cNvPr id="11" name="Picture 10"/>
+          <p:cNvPicPr>
+            <a:picLocks noChangeAspect="1"/>
+          </p:cNvPicPr>
+          <p:nvPr/>
+        </p:nvPicPr>
+        <p:blipFill>
+          <a:blip r:embed="rId5"/>
+          <a:stretch>
+            <a:fillRect/>
+          </a:stretch>
+        </p:blipFill>
+        <p:spPr>
+          <a:xfrm>
+            <a:off x="6292516" y="940358"/>
+            <a:ext cx="5899484" cy="5917641"/>
+          </a:xfrm>
+          <a:prstGeom prst="rect">
+            <a:avLst/>
+          </a:prstGeom>
+          <a:ln>
+            <a:solidFill>
+              <a:schemeClr val="accent6"/>
+            </a:solidFill>
+          </a:ln>
+        </p:spPr>
+      </p:pic>
+    </p:spTree>
+    <p:extLst>
+      <p:ext uri="{BB962C8B-B14F-4D97-AF65-F5344CB8AC3E}">
+        <p14:creationId xmlns:p14="http://schemas.microsoft.com/office/powerpoint/2010/main" val="605615"/>
+      </p:ext>
+    </p:extLst>
+  </p:cSld>
+  <p:clrMapOvr>
+    <a:masterClrMapping/>
+  </p:clrMapOvr>
+  <mc:AlternateContent xmlns:mc="http://schemas.openxmlformats.org/markup-compatibility/2006" xmlns:p14="http://schemas.microsoft.com/office/powerpoint/2010/main">
+    <mc:Choice Requires="p14">
+      <p:transition spd="slow" p14:dur="1500">
+        <p:random/>
+      </p:transition>
+    </mc:Choice>
+    <mc:Fallback xmlns="">
+      <p:transition spd="slow">
+        <p:random/>
+      </p:transition>
+    </mc:Fallback>
+  </mc:AlternateContent>
+  <p:timing>
+    <p:tnLst>
+      <p:par>
+        <p:cTn id="1" dur="indefinite" restart="never" nodeType="tmRoot"/>
+      </p:par>
+    </p:tnLst>
+  </p:timing>
+</p:sld>
+</file>
+
+<file path=ppt/slides/slide4.xml><?xml version="1.0" encoding="utf-8"?>
+<p:sld xmlns:a="http://schemas.openxmlformats.org/drawingml/2006/main" xmlns:r="http://schemas.openxmlformats.org/officeDocument/2006/relationships" xmlns:p="http://schemas.openxmlformats.org/presentationml/2006/main">
+  <p:cSld>
+    <p:spTree>
+      <p:nvGrpSpPr>
+        <p:cNvPr id="1" name=""/>
+        <p:cNvGrpSpPr/>
+        <p:nvPr/>
+      </p:nvGrpSpPr>
+      <p:grpSpPr>
+        <a:xfrm>
+          <a:off x="0" y="0"/>
+          <a:ext cx="0" cy="0"/>
+          <a:chOff x="0" y="0"/>
+          <a:chExt cx="0" cy="0"/>
+        </a:xfrm>
+      </p:grpSpPr>
       <p:sp>
         <p:nvSpPr>
           <p:cNvPr id="4" name="Title 3"/>

</xml_diff>